<commit_message>
Fixed slide in 3rd presentation.
</commit_message>
<xml_diff>
--- a/media/MathematicalModelingOfEpidemology3.pptx
+++ b/media/MathematicalModelingOfEpidemology3.pptx
@@ -8110,15 +8110,54 @@
                   </a:spcBef>
                   <a:buNone/>
                 </a:pPr>
-                <a:endParaRPr lang="en-US" sz="2400" dirty="0">
-                  <a:solidFill>
-                    <a:schemeClr val="dk1"/>
-                  </a:solidFill>
-                  <a:latin typeface="Trebuchet MS" panose="020B0603020202020204" pitchFamily="34" charset="0"/>
-                  <a:ea typeface="Trebuchet MS"/>
-                  <a:cs typeface="Trebuchet MS"/>
-                  <a:sym typeface="Trebuchet MS"/>
-                </a:endParaRPr>
+                <a:r>
+                  <a:rPr lang="bg-BG" sz="2400" dirty="0">
+                    <a:solidFill>
+                      <a:schemeClr val="dk1"/>
+                    </a:solidFill>
+                    <a:latin typeface="Trebuchet MS" panose="020B0603020202020204" pitchFamily="34" charset="0"/>
+                    <a:ea typeface="Trebuchet MS"/>
+                    <a:cs typeface="Trebuchet MS"/>
+                    <a:sym typeface="Trebuchet MS"/>
+                  </a:rPr>
+                  <a:t>След фиксиран брой итерации </a:t>
+                </a:r>
+                <a:r>
+                  <a:rPr lang="en-US" sz="2400" dirty="0">
+                    <a:solidFill>
+                      <a:schemeClr val="dk1"/>
+                    </a:solidFill>
+                    <a:latin typeface="Trebuchet MS" panose="020B0603020202020204" pitchFamily="34" charset="0"/>
+                    <a:ea typeface="Trebuchet MS"/>
+                    <a:cs typeface="Trebuchet MS"/>
+                    <a:sym typeface="Trebuchet MS"/>
+                  </a:rPr>
+                  <a:t>removed </a:t>
+                </a:r>
+                <a:r>
+                  <a:rPr lang="bg-BG" sz="2400" dirty="0">
+                    <a:solidFill>
+                      <a:schemeClr val="dk1"/>
+                    </a:solidFill>
+                    <a:latin typeface="Trebuchet MS" panose="020B0603020202020204" pitchFamily="34" charset="0"/>
+                    <a:ea typeface="Trebuchet MS"/>
+                    <a:cs typeface="Trebuchet MS"/>
+                    <a:sym typeface="Trebuchet MS"/>
+                  </a:rPr>
+                  <a:t>клетките преминават в </a:t>
+                </a:r>
+                <a:r>
+                  <a:rPr lang="en-US" sz="2400" dirty="0">
+                    <a:solidFill>
+                      <a:schemeClr val="dk1"/>
+                    </a:solidFill>
+                    <a:latin typeface="Trebuchet MS" panose="020B0603020202020204" pitchFamily="34" charset="0"/>
+                    <a:ea typeface="Trebuchet MS"/>
+                    <a:cs typeface="Trebuchet MS"/>
+                    <a:sym typeface="Trebuchet MS"/>
+                  </a:rPr>
+                  <a:t>susceptible.</a:t>
+                </a:r>
               </a:p>
               <a:p>
                 <a:pPr lvl="0">
@@ -15447,13 +15486,7 @@
                             <a:rPr lang="en-US" sz="3200" i="1">
                               <a:latin typeface="Cambria Math" panose="02040503050406030204" pitchFamily="18" charset="0"/>
                             </a:rPr>
-                            <m:t>+</m:t>
-                          </m:r>
-                          <m:r>
-                            <a:rPr lang="en-US" sz="3200" i="1">
-                              <a:latin typeface="Cambria Math" panose="02040503050406030204" pitchFamily="18" charset="0"/>
-                            </a:rPr>
-                            <m:t>1</m:t>
+                            <m:t>+1</m:t>
                           </m:r>
                         </m:sub>
                       </m:sSub>

</xml_diff>